<commit_message>
fix: vad too late.
</commit_message>
<xml_diff>
--- a/asset/presentation.pptx
+++ b/asset/presentation.pptx
@@ -5,19 +5,24 @@
     <p:sldMasterId id="2147483648" r:id="rId1"/>
   </p:sldMasterIdLst>
   <p:notesMasterIdLst>
-    <p:notesMasterId r:id="rId7"/>
+    <p:notesMasterId r:id="rId9"/>
   </p:notesMasterIdLst>
   <p:sldIdLst>
     <p:sldId id="256" r:id="rId3"/>
-    <p:sldId id="257" r:id="rId4"/>
-    <p:sldId id="258" r:id="rId5"/>
-    <p:sldId id="261" r:id="rId6"/>
-    <p:sldId id="259" r:id="rId8"/>
-    <p:sldId id="260" r:id="rId9"/>
-    <p:sldId id="262" r:id="rId10"/>
-    <p:sldId id="263" r:id="rId11"/>
-    <p:sldId id="264" r:id="rId12"/>
-    <p:sldId id="265" r:id="rId13"/>
+    <p:sldId id="269" r:id="rId4"/>
+    <p:sldId id="281" r:id="rId5"/>
+    <p:sldId id="257" r:id="rId6"/>
+    <p:sldId id="258" r:id="rId7"/>
+    <p:sldId id="261" r:id="rId8"/>
+    <p:sldId id="282" r:id="rId10"/>
+    <p:sldId id="259" r:id="rId11"/>
+    <p:sldId id="268" r:id="rId12"/>
+    <p:sldId id="260" r:id="rId13"/>
+    <p:sldId id="262" r:id="rId14"/>
+    <p:sldId id="263" r:id="rId15"/>
+    <p:sldId id="264" r:id="rId16"/>
+    <p:sldId id="270" r:id="rId17"/>
+    <p:sldId id="265" r:id="rId18"/>
   </p:sldIdLst>
   <p:sldSz cx="12192000" cy="6858000"/>
   <p:notesSz cx="6858000" cy="9144000"/>
@@ -3508,6 +3513,338 @@
           <a:p>
             <a:r>
               <a:rPr lang="x-none" altLang="en-US"/>
+              <a:t>Thus</a:t>
+            </a:r>
+            <a:endParaRPr lang="x-none" altLang="en-US"/>
+          </a:p>
+        </p:txBody>
+      </p:sp>
+      <p:sp>
+        <p:nvSpPr>
+          <p:cNvPr id="3" name="Content Placeholder 2"/>
+          <p:cNvSpPr>
+            <a:spLocks noGrp="1"/>
+          </p:cNvSpPr>
+          <p:nvPr>
+            <p:ph idx="1"/>
+          </p:nvPr>
+        </p:nvSpPr>
+        <p:spPr/>
+        <p:txBody>
+          <a:bodyPr/>
+          <a:p>
+            <a:r>
+              <a:rPr lang="x-none" altLang="en-US"/>
+              <a:t>Caesar</a:t>
+            </a:r>
+            <a:endParaRPr lang="x-none" altLang="en-US"/>
+          </a:p>
+          <a:p>
+            <a:pPr lvl="1"/>
+            <a:r>
+              <a:rPr lang="x-none" altLang="en-US"/>
+              <a:t>Voice + Web + AI</a:t>
+            </a:r>
+            <a:endParaRPr lang="x-none" altLang="en-US"/>
+          </a:p>
+          <a:p>
+            <a:pPr lvl="0"/>
+            <a:r>
+              <a:rPr lang="x-none" altLang="en-US" sz="2800"/>
+              <a:t>What it is like</a:t>
+            </a:r>
+            <a:endParaRPr lang="x-none" altLang="en-US" sz="2800"/>
+          </a:p>
+          <a:p>
+            <a:pPr lvl="1"/>
+            <a:r>
+              <a:rPr lang="x-none" altLang="en-US"/>
+              <a:t>A helper, recorder, learner, my ghost in the cloudware...</a:t>
+            </a:r>
+            <a:endParaRPr lang="x-none" altLang="en-US"/>
+          </a:p>
+        </p:txBody>
+      </p:sp>
+    </p:spTree>
+  </p:cSld>
+  <p:clrMapOvr>
+    <a:masterClrMapping/>
+  </p:clrMapOvr>
+</p:sld>
+</file>
+
+<file path=ppt/slides/slide11.xml><?xml version="1.0" encoding="utf-8"?>
+<p:sld xmlns:a="http://schemas.openxmlformats.org/drawingml/2006/main" xmlns:r="http://schemas.openxmlformats.org/officeDocument/2006/relationships" xmlns:p="http://schemas.openxmlformats.org/presentationml/2006/main">
+  <p:cSld>
+    <p:spTree>
+      <p:nvGrpSpPr>
+        <p:cNvPr id="1" name=""/>
+        <p:cNvGrpSpPr/>
+        <p:nvPr/>
+      </p:nvGrpSpPr>
+      <p:grpSpPr/>
+      <p:sp>
+        <p:nvSpPr>
+          <p:cNvPr id="2" name="Title 1"/>
+          <p:cNvSpPr>
+            <a:spLocks noGrp="1"/>
+          </p:cNvSpPr>
+          <p:nvPr>
+            <p:ph type="title"/>
+          </p:nvPr>
+        </p:nvSpPr>
+        <p:spPr/>
+        <p:txBody>
+          <a:bodyPr/>
+          <a:p>
+            <a:r>
+              <a:rPr lang="x-none" altLang="en-US"/>
+              <a:t>Part I, Voice + Web</a:t>
+            </a:r>
+            <a:endParaRPr lang="x-none" altLang="en-US"/>
+          </a:p>
+        </p:txBody>
+      </p:sp>
+      <p:sp>
+        <p:nvSpPr>
+          <p:cNvPr id="3" name="Content Placeholder 2"/>
+          <p:cNvSpPr>
+            <a:spLocks noGrp="1"/>
+          </p:cNvSpPr>
+          <p:nvPr>
+            <p:ph idx="1"/>
+          </p:nvPr>
+        </p:nvSpPr>
+        <p:spPr/>
+        <p:txBody>
+          <a:bodyPr/>
+          <a:p>
+            <a:r>
+              <a:rPr lang="x-none" altLang="en-US" sz="2800"/>
+              <a:t>Voice command to voice action</a:t>
+            </a:r>
+            <a:endParaRPr lang="x-none" altLang="en-US"/>
+          </a:p>
+        </p:txBody>
+      </p:sp>
+    </p:spTree>
+  </p:cSld>
+  <p:clrMapOvr>
+    <a:masterClrMapping/>
+  </p:clrMapOvr>
+</p:sld>
+</file>
+
+<file path=ppt/slides/slide12.xml><?xml version="1.0" encoding="utf-8"?>
+<p:sld xmlns:a="http://schemas.openxmlformats.org/drawingml/2006/main" xmlns:r="http://schemas.openxmlformats.org/officeDocument/2006/relationships" xmlns:p="http://schemas.openxmlformats.org/presentationml/2006/main">
+  <p:cSld>
+    <p:spTree>
+      <p:nvGrpSpPr>
+        <p:cNvPr id="1" name=""/>
+        <p:cNvGrpSpPr/>
+        <p:nvPr/>
+      </p:nvGrpSpPr>
+      <p:grpSpPr/>
+      <p:sp>
+        <p:nvSpPr>
+          <p:cNvPr id="2" name="Title 1"/>
+          <p:cNvSpPr>
+            <a:spLocks noGrp="1"/>
+          </p:cNvSpPr>
+          <p:nvPr>
+            <p:ph type="title"/>
+          </p:nvPr>
+        </p:nvSpPr>
+        <p:spPr/>
+        <p:txBody>
+          <a:bodyPr/>
+          <a:p>
+            <a:r>
+              <a:rPr lang="x-none" altLang="en-US"/>
+              <a:t>Part II, AI</a:t>
+            </a:r>
+            <a:endParaRPr lang="x-none" altLang="en-US"/>
+          </a:p>
+        </p:txBody>
+      </p:sp>
+      <p:sp>
+        <p:nvSpPr>
+          <p:cNvPr id="3" name="Content Placeholder 2"/>
+          <p:cNvSpPr>
+            <a:spLocks noGrp="1"/>
+          </p:cNvSpPr>
+          <p:nvPr>
+            <p:ph idx="1"/>
+          </p:nvPr>
+        </p:nvSpPr>
+        <p:spPr/>
+        <p:txBody>
+          <a:bodyPr/>
+          <a:p>
+            <a:r>
+              <a:rPr lang="x-none" altLang="en-US">
+                <a:sym typeface="+mn-ea"/>
+              </a:rPr>
+              <a:t>Cross-site service makes user profile easy</a:t>
+            </a:r>
+            <a:endParaRPr lang="x-none" altLang="en-US"/>
+          </a:p>
+        </p:txBody>
+      </p:sp>
+    </p:spTree>
+  </p:cSld>
+  <p:clrMapOvr>
+    <a:masterClrMapping/>
+  </p:clrMapOvr>
+</p:sld>
+</file>
+
+<file path=ppt/slides/slide13.xml><?xml version="1.0" encoding="utf-8"?>
+<p:sld xmlns:a="http://schemas.openxmlformats.org/drawingml/2006/main" xmlns:r="http://schemas.openxmlformats.org/officeDocument/2006/relationships" xmlns:p="http://schemas.openxmlformats.org/presentationml/2006/main">
+  <p:cSld>
+    <p:spTree>
+      <p:nvGrpSpPr>
+        <p:cNvPr id="1" name=""/>
+        <p:cNvGrpSpPr/>
+        <p:nvPr/>
+      </p:nvGrpSpPr>
+      <p:grpSpPr/>
+      <p:sp>
+        <p:nvSpPr>
+          <p:cNvPr id="2" name="Title 1"/>
+          <p:cNvSpPr>
+            <a:spLocks noGrp="1"/>
+          </p:cNvSpPr>
+          <p:nvPr>
+            <p:ph type="title"/>
+          </p:nvPr>
+        </p:nvSpPr>
+        <p:spPr/>
+        <p:txBody>
+          <a:bodyPr/>
+          <a:p>
+            <a:r>
+              <a:rPr lang="x-none" altLang="en-US"/>
+              <a:t>Part III, UI</a:t>
+            </a:r>
+            <a:endParaRPr lang="x-none" altLang="en-US"/>
+          </a:p>
+        </p:txBody>
+      </p:sp>
+      <p:sp>
+        <p:nvSpPr>
+          <p:cNvPr id="3" name="Content Placeholder 2"/>
+          <p:cNvSpPr>
+            <a:spLocks noGrp="1"/>
+          </p:cNvSpPr>
+          <p:nvPr>
+            <p:ph idx="1"/>
+          </p:nvPr>
+        </p:nvSpPr>
+        <p:spPr/>
+        <p:txBody>
+          <a:bodyPr/>
+          <a:p>
+            <a:r>
+              <a:rPr lang="x-none" altLang="en-US"/>
+              <a:t>See it!</a:t>
+            </a:r>
+            <a:endParaRPr lang="x-none" altLang="en-US"/>
+          </a:p>
+        </p:txBody>
+      </p:sp>
+    </p:spTree>
+  </p:cSld>
+  <p:clrMapOvr>
+    <a:masterClrMapping/>
+  </p:clrMapOvr>
+</p:sld>
+</file>
+
+<file path=ppt/slides/slide14.xml><?xml version="1.0" encoding="utf-8"?>
+<p:sld xmlns:a="http://schemas.openxmlformats.org/drawingml/2006/main" xmlns:r="http://schemas.openxmlformats.org/officeDocument/2006/relationships" xmlns:p="http://schemas.openxmlformats.org/presentationml/2006/main">
+  <p:cSld>
+    <p:spTree>
+      <p:nvGrpSpPr>
+        <p:cNvPr id="1" name=""/>
+        <p:cNvGrpSpPr/>
+        <p:nvPr/>
+      </p:nvGrpSpPr>
+      <p:grpSpPr/>
+      <p:sp>
+        <p:nvSpPr>
+          <p:cNvPr id="2" name="Title 1"/>
+          <p:cNvSpPr>
+            <a:spLocks noGrp="1"/>
+          </p:cNvSpPr>
+          <p:nvPr>
+            <p:ph type="title"/>
+          </p:nvPr>
+        </p:nvSpPr>
+        <p:spPr/>
+        <p:txBody>
+          <a:bodyPr/>
+          <a:p>
+            <a:r>
+              <a:rPr lang="x-none" altLang="en-US"/>
+              <a:t>Demo time...</a:t>
+            </a:r>
+            <a:endParaRPr lang="x-none" altLang="en-US"/>
+          </a:p>
+        </p:txBody>
+      </p:sp>
+      <p:sp>
+        <p:nvSpPr>
+          <p:cNvPr id="3" name="Content Placeholder 2"/>
+          <p:cNvSpPr>
+            <a:spLocks noGrp="1"/>
+          </p:cNvSpPr>
+          <p:nvPr>
+            <p:ph idx="1"/>
+          </p:nvPr>
+        </p:nvSpPr>
+        <p:spPr/>
+        <p:txBody>
+          <a:bodyPr/>
+          <a:p>
+            <a:endParaRPr lang="x-none" altLang="en-US"/>
+          </a:p>
+        </p:txBody>
+      </p:sp>
+    </p:spTree>
+  </p:cSld>
+  <p:clrMapOvr>
+    <a:masterClrMapping/>
+  </p:clrMapOvr>
+</p:sld>
+</file>
+
+<file path=ppt/slides/slide15.xml><?xml version="1.0" encoding="utf-8"?>
+<p:sld xmlns:a="http://schemas.openxmlformats.org/drawingml/2006/main" xmlns:r="http://schemas.openxmlformats.org/officeDocument/2006/relationships" xmlns:p="http://schemas.openxmlformats.org/presentationml/2006/main">
+  <p:cSld>
+    <p:spTree>
+      <p:nvGrpSpPr>
+        <p:cNvPr id="1" name=""/>
+        <p:cNvGrpSpPr/>
+        <p:nvPr/>
+      </p:nvGrpSpPr>
+      <p:grpSpPr/>
+      <p:sp>
+        <p:nvSpPr>
+          <p:cNvPr id="2" name="Title 1"/>
+          <p:cNvSpPr>
+            <a:spLocks noGrp="1"/>
+          </p:cNvSpPr>
+          <p:nvPr>
+            <p:ph type="title"/>
+          </p:nvPr>
+        </p:nvSpPr>
+        <p:spPr/>
+        <p:txBody>
+          <a:bodyPr/>
+          <a:p>
+            <a:r>
+              <a:rPr lang="x-none" altLang="en-US"/>
               <a:t>Where does Web AI Service start?</a:t>
             </a:r>
             <a:endParaRPr lang="x-none" altLang="en-US"/>
@@ -3570,7 +3907,7 @@
           <a:p>
             <a:r>
               <a:rPr lang="x-none" altLang="en-US"/>
-              <a:t>Voice Control</a:t>
+              <a:t>Subject</a:t>
             </a:r>
             <a:endParaRPr lang="x-none" altLang="en-US"/>
           </a:p>
@@ -3592,7 +3929,7 @@
           <a:p>
             <a:r>
               <a:rPr lang="x-none" altLang="en-US"/>
-              <a:t>Live broadcasting is now pop, telling us that:</a:t>
+              <a:t>An Independent Online AI Service</a:t>
             </a:r>
             <a:endParaRPr lang="x-none" altLang="en-US"/>
           </a:p>
@@ -3600,28 +3937,16 @@
             <a:pPr lvl="1"/>
             <a:r>
               <a:rPr lang="x-none" altLang="en-US"/>
-              <a:t>Voice counts!</a:t>
+              <a:t>Voice-based</a:t>
             </a:r>
             <a:endParaRPr lang="x-none" altLang="en-US"/>
           </a:p>
           <a:p>
-            <a:pPr lvl="0"/>
+            <a:pPr lvl="1"/>
             <a:r>
               <a:rPr lang="x-none" altLang="en-US"/>
-              <a:t>Voice functions are bundled with OSes and apps, so</a:t>
-            </a:r>
-            <a:endParaRPr lang="x-none" altLang="en-US"/>
-          </a:p>
-          <a:p>
-            <a:pPr lvl="1"/>
-            <a:r>
-              <a:rPr lang="x-none" altLang="en-US"/>
-              <a:t>What about Web?</a:t>
-            </a:r>
-            <a:endParaRPr lang="x-none" altLang="en-US"/>
-          </a:p>
-          <a:p>
-            <a:pPr lvl="0"/>
+              <a:t>Cross-site</a:t>
+            </a:r>
             <a:endParaRPr lang="x-none" altLang="en-US"/>
           </a:p>
         </p:txBody>
@@ -3651,7 +3976,7 @@
             <a:spLocks noGrp="1"/>
           </p:cNvSpPr>
           <p:nvPr>
-            <p:ph type="title"/>
+            <p:ph type="ctrTitle"/>
           </p:nvPr>
         </p:nvSpPr>
         <p:spPr/>
@@ -3660,58 +3985,8 @@
           <a:p>
             <a:r>
               <a:rPr lang="x-none" altLang="en-US"/>
-              <a:t>Voice Auth</a:t>
-            </a:r>
-            <a:endParaRPr lang="x-none" altLang="en-US"/>
-          </a:p>
-        </p:txBody>
-      </p:sp>
-      <p:sp>
-        <p:nvSpPr>
-          <p:cNvPr id="3" name="Content Placeholder 2"/>
-          <p:cNvSpPr>
-            <a:spLocks noGrp="1"/>
-          </p:cNvSpPr>
-          <p:nvPr>
-            <p:ph idx="1"/>
-          </p:nvPr>
-        </p:nvSpPr>
-        <p:spPr/>
-        <p:txBody>
-          <a:bodyPr/>
-          <a:p>
-            <a:r>
-              <a:rPr lang="x-none" altLang="en-US"/>
-              <a:t>Security</a:t>
-            </a:r>
-            <a:endParaRPr lang="x-none" altLang="en-US"/>
-          </a:p>
-          <a:p>
-            <a:pPr lvl="1"/>
-            <a:r>
-              <a:rPr lang="x-none" altLang="en-US"/>
-              <a:t>Voiceprint</a:t>
-            </a:r>
-            <a:endParaRPr lang="x-none" altLang="en-US"/>
-          </a:p>
-          <a:p>
-            <a:pPr lvl="0"/>
-            <a:r>
-              <a:rPr lang="x-none" altLang="en-US" sz="2800"/>
-              <a:t>Significance</a:t>
-            </a:r>
-            <a:endParaRPr lang="x-none" altLang="en-US" sz="2800"/>
-          </a:p>
-          <a:p>
-            <a:pPr lvl="1"/>
-            <a:r>
-              <a:rPr lang="x-none" altLang="en-US" sz="2400"/>
-              <a:t>Only if AUTH, there is SERVICE</a:t>
-            </a:r>
-            <a:endParaRPr lang="x-none" altLang="en-US" sz="2400"/>
-          </a:p>
-          <a:p>
-            <a:pPr lvl="0"/>
+              <a:t>Why voice</a:t>
+            </a:r>
             <a:endParaRPr lang="x-none" altLang="en-US"/>
           </a:p>
         </p:txBody>
@@ -3750,7 +4025,7 @@
           <a:p>
             <a:r>
               <a:rPr lang="x-none" altLang="en-US"/>
-              <a:t>Voice Service</a:t>
+              <a:t>Voice Control</a:t>
             </a:r>
             <a:endParaRPr lang="x-none" altLang="en-US"/>
           </a:p>
@@ -3770,75 +4045,38 @@
         <p:txBody>
           <a:bodyPr/>
           <a:p>
+            <a:r>
+              <a:rPr lang="x-none" altLang="en-US"/>
+              <a:t>Live broadcasting is now pop, telling us that:</a:t>
+            </a:r>
+            <a:endParaRPr lang="x-none" altLang="en-US"/>
+          </a:p>
+          <a:p>
+            <a:pPr lvl="1"/>
+            <a:r>
+              <a:rPr lang="x-none" altLang="en-US"/>
+              <a:t>Voice counts!</a:t>
+            </a:r>
+            <a:endParaRPr lang="x-none" altLang="en-US"/>
+          </a:p>
+          <a:p>
             <a:pPr lvl="0"/>
             <a:r>
-              <a:rPr lang="x-none" altLang="en-US" sz="2800">
-                <a:sym typeface="+mn-ea"/>
-              </a:rPr>
-              <a:t>There can be a third-party service that </a:t>
-            </a:r>
-            <a:endParaRPr lang="x-none" altLang="en-US" sz="2800"/>
+              <a:rPr lang="x-none" altLang="en-US"/>
+              <a:t>Voice functions are bundled with OSes and apps, so</a:t>
+            </a:r>
+            <a:endParaRPr lang="x-none" altLang="en-US"/>
           </a:p>
           <a:p>
             <a:pPr lvl="1"/>
             <a:r>
-              <a:rPr lang="x-none" altLang="en-US" sz="2800">
-                <a:sym typeface="+mn-ea"/>
-              </a:rPr>
-              <a:t>Calls for (and makes full use of) user voice</a:t>
-            </a:r>
-            <a:endParaRPr lang="x-none" altLang="en-US" sz="2800"/>
-          </a:p>
-          <a:p>
-            <a:pPr lvl="1"/>
-            <a:r>
-              <a:rPr lang="x-none" altLang="en-US" sz="2800">
-                <a:sym typeface="+mn-ea"/>
-              </a:rPr>
-              <a:t>Takes charge of user characters and interest</a:t>
-            </a:r>
-            <a:endParaRPr lang="x-none" altLang="en-US" sz="2800">
-              <a:sym typeface="+mn-ea"/>
-            </a:endParaRPr>
+              <a:rPr lang="x-none" altLang="en-US"/>
+              <a:t>What about Web?</a:t>
+            </a:r>
+            <a:endParaRPr lang="x-none" altLang="en-US"/>
           </a:p>
           <a:p>
             <a:pPr lvl="0"/>
-            <a:r>
-              <a:rPr lang="x-none" altLang="en-US"/>
-              <a:t>It can</a:t>
-            </a:r>
-            <a:endParaRPr lang="x-none" altLang="en-US"/>
-          </a:p>
-          <a:p>
-            <a:pPr lvl="1"/>
-            <a:r>
-              <a:rPr lang="x-none" altLang="en-US"/>
-              <a:t>Log in/out</a:t>
-            </a:r>
-            <a:endParaRPr lang="x-none" altLang="en-US"/>
-          </a:p>
-          <a:p>
-            <a:pPr lvl="1"/>
-            <a:r>
-              <a:rPr lang="x-none" altLang="en-US"/>
-              <a:t>Search things</a:t>
-            </a:r>
-            <a:endParaRPr lang="x-none" altLang="en-US"/>
-          </a:p>
-          <a:p>
-            <a:pPr lvl="1"/>
-            <a:r>
-              <a:rPr lang="x-none" altLang="en-US"/>
-              <a:t>Post Zhibo Danmu</a:t>
-            </a:r>
-            <a:endParaRPr lang="x-none" altLang="en-US"/>
-          </a:p>
-          <a:p>
-            <a:pPr lvl="1"/>
-            <a:r>
-              <a:rPr lang="x-none" altLang="en-US"/>
-              <a:t>Allow User to customize any action</a:t>
-            </a:r>
             <a:endParaRPr lang="x-none" altLang="en-US"/>
           </a:p>
         </p:txBody>
@@ -3877,7 +4115,7 @@
           <a:p>
             <a:r>
               <a:rPr lang="x-none" altLang="en-US"/>
-              <a:t>Trend</a:t>
+              <a:t>Voice Auth</a:t>
             </a:r>
             <a:endParaRPr lang="x-none" altLang="en-US"/>
           </a:p>
@@ -3899,8 +4137,36 @@
           <a:p>
             <a:r>
               <a:rPr lang="x-none" altLang="en-US"/>
-              <a:t>Alibaba</a:t>
-            </a:r>
+              <a:t>Security</a:t>
+            </a:r>
+            <a:endParaRPr lang="x-none" altLang="en-US"/>
+          </a:p>
+          <a:p>
+            <a:pPr lvl="1"/>
+            <a:r>
+              <a:rPr lang="x-none" altLang="en-US"/>
+              <a:t>Voiceprint</a:t>
+            </a:r>
+            <a:endParaRPr lang="x-none" altLang="en-US"/>
+          </a:p>
+          <a:p>
+            <a:pPr lvl="0"/>
+            <a:r>
+              <a:rPr lang="x-none" altLang="en-US" sz="2800"/>
+              <a:t>Significance</a:t>
+            </a:r>
+            <a:endParaRPr lang="x-none" altLang="en-US" sz="2800"/>
+          </a:p>
+          <a:p>
+            <a:pPr lvl="1"/>
+            <a:r>
+              <a:rPr lang="x-none" altLang="en-US" sz="2400"/>
+              <a:t>Only if AUTH, there is SERVICE</a:t>
+            </a:r>
+            <a:endParaRPr lang="x-none" altLang="en-US" sz="2400"/>
+          </a:p>
+          <a:p>
+            <a:pPr lvl="0"/>
             <a:endParaRPr lang="x-none" altLang="en-US"/>
           </a:p>
         </p:txBody>
@@ -3939,7 +4205,7 @@
           <a:p>
             <a:r>
               <a:rPr lang="x-none" altLang="en-US"/>
-              <a:t>Thus</a:t>
+              <a:t>Voice Service</a:t>
             </a:r>
             <a:endParaRPr lang="x-none" altLang="en-US"/>
           </a:p>
@@ -3959,9 +4225,42 @@
         <p:txBody>
           <a:bodyPr/>
           <a:p>
+            <a:pPr lvl="0"/>
+            <a:r>
+              <a:rPr lang="x-none" altLang="en-US" sz="2800">
+                <a:sym typeface="+mn-ea"/>
+              </a:rPr>
+              <a:t>There can be a third-party service that </a:t>
+            </a:r>
+            <a:endParaRPr lang="x-none" altLang="en-US" sz="2800"/>
+          </a:p>
+          <a:p>
+            <a:pPr lvl="1"/>
+            <a:r>
+              <a:rPr lang="x-none" altLang="en-US" sz="2800">
+                <a:sym typeface="+mn-ea"/>
+              </a:rPr>
+              <a:t>Calls for (and makes full use of) user voice</a:t>
+            </a:r>
+            <a:endParaRPr lang="x-none" altLang="en-US" sz="2800"/>
+          </a:p>
+          <a:p>
+            <a:pPr lvl="1"/>
+            <a:r>
+              <a:rPr lang="x-none" altLang="en-US" sz="2800">
+                <a:sym typeface="+mn-ea"/>
+              </a:rPr>
+              <a:t>Takes charge of user characters and interest</a:t>
+            </a:r>
+            <a:endParaRPr lang="x-none" altLang="en-US" sz="2800">
+              <a:sym typeface="+mn-ea"/>
+            </a:endParaRPr>
+          </a:p>
+          <a:p>
+            <a:pPr lvl="0"/>
             <a:r>
               <a:rPr lang="x-none" altLang="en-US"/>
-              <a:t>Carsar</a:t>
+              <a:t>It can</a:t>
             </a:r>
             <a:endParaRPr lang="x-none" altLang="en-US"/>
           </a:p>
@@ -3969,23 +4268,15 @@
             <a:pPr lvl="1"/>
             <a:r>
               <a:rPr lang="x-none" altLang="en-US"/>
-              <a:t>Voice + Web + AI</a:t>
+              <a:t>Log in/out</a:t>
             </a:r>
             <a:endParaRPr lang="x-none" altLang="en-US"/>
           </a:p>
           <a:p>
-            <a:pPr lvl="0"/>
-            <a:r>
-              <a:rPr lang="x-none" altLang="en-US" sz="2800"/>
-              <a:t>What it is like</a:t>
-            </a:r>
-            <a:endParaRPr lang="x-none" altLang="en-US" sz="2800"/>
-          </a:p>
-          <a:p>
             <a:pPr lvl="1"/>
             <a:r>
               <a:rPr lang="x-none" altLang="en-US"/>
-              <a:t>A helper, recorder, learner</a:t>
+              <a:t>Search things</a:t>
             </a:r>
             <a:endParaRPr lang="x-none" altLang="en-US"/>
           </a:p>
@@ -3993,7 +4284,15 @@
             <a:pPr lvl="1"/>
             <a:r>
               <a:rPr lang="x-none" altLang="en-US"/>
-              <a:t>My ghost in the cloud</a:t>
+              <a:t>Post Zhibo Danmu</a:t>
+            </a:r>
+            <a:endParaRPr lang="x-none" altLang="en-US"/>
+          </a:p>
+          <a:p>
+            <a:pPr lvl="1"/>
+            <a:r>
+              <a:rPr lang="x-none" altLang="en-US"/>
+              <a:t>Allow User to customize any action</a:t>
             </a:r>
             <a:endParaRPr lang="x-none" altLang="en-US"/>
           </a:p>
@@ -4024,7 +4323,7 @@
             <a:spLocks noGrp="1"/>
           </p:cNvSpPr>
           <p:nvPr>
-            <p:ph type="title"/>
+            <p:ph type="ctrTitle"/>
           </p:nvPr>
         </p:nvSpPr>
         <p:spPr/>
@@ -4033,29 +4332,7 @@
           <a:p>
             <a:r>
               <a:rPr lang="x-none" altLang="en-US"/>
-              <a:t>Part I, Voice + Web</a:t>
-            </a:r>
-            <a:endParaRPr lang="x-none" altLang="en-US"/>
-          </a:p>
-        </p:txBody>
-      </p:sp>
-      <p:sp>
-        <p:nvSpPr>
-          <p:cNvPr id="3" name="Content Placeholder 2"/>
-          <p:cNvSpPr>
-            <a:spLocks noGrp="1"/>
-          </p:cNvSpPr>
-          <p:nvPr>
-            <p:ph idx="1"/>
-          </p:nvPr>
-        </p:nvSpPr>
-        <p:spPr/>
-        <p:txBody>
-          <a:bodyPr/>
-          <a:p>
-            <a:r>
-              <a:rPr lang="x-none" altLang="en-US"/>
-              <a:t>Go for demos!</a:t>
+              <a:t>Why Web</a:t>
             </a:r>
             <a:endParaRPr lang="x-none" altLang="en-US"/>
           </a:p>
@@ -4095,7 +4372,7 @@
           <a:p>
             <a:r>
               <a:rPr lang="x-none" altLang="en-US"/>
-              <a:t>Part II, AI</a:t>
+              <a:t>Trend</a:t>
             </a:r>
             <a:endParaRPr lang="x-none" altLang="en-US"/>
           </a:p>
@@ -4117,7 +4394,7 @@
           <a:p>
             <a:r>
               <a:rPr lang="x-none" altLang="en-US"/>
-              <a:t>Go for demo!</a:t>
+              <a:t>Alibaba</a:t>
             </a:r>
             <a:endParaRPr lang="x-none" altLang="en-US"/>
           </a:p>
@@ -4157,7 +4434,7 @@
           <a:p>
             <a:r>
               <a:rPr lang="x-none" altLang="en-US"/>
-              <a:t>Part III, UI</a:t>
+              <a:t>Thus</a:t>
             </a:r>
             <a:endParaRPr lang="x-none" altLang="en-US"/>
           </a:p>
@@ -4179,7 +4456,7 @@
           <a:p>
             <a:r>
               <a:rPr lang="x-none" altLang="en-US"/>
-              <a:t>Just what you have seen!</a:t>
+              <a:t>Web + Auth + Data ~ User Profile ~ Web AI</a:t>
             </a:r>
             <a:endParaRPr lang="x-none" altLang="en-US"/>
           </a:p>

</xml_diff>